<commit_message>
Add pipeline for CrowdSPIRE
</commit_message>
<xml_diff>
--- a/docs/pipeline.pptx
+++ b/docs/pipeline.pptx
@@ -2964,367 +2964,1441 @@
           <a:chExt cx="0" cy="0"/>
         </a:xfrm>
       </p:grpSpPr>
-      <p:sp>
-        <p:nvSpPr>
-          <p:cNvPr id="5" name="Rounded Rectangle 4"/>
-          <p:cNvSpPr/>
+      <p:grpSp>
+        <p:nvGrpSpPr>
+          <p:cNvPr id="57" name="Group 56"/>
+          <p:cNvGrpSpPr/>
           <p:nvPr/>
-        </p:nvSpPr>
-        <p:spPr>
+        </p:nvGrpSpPr>
+        <p:grpSpPr>
           <a:xfrm>
-            <a:off x="2598573" y="1896162"/>
-            <a:ext cx="1068405" cy="462013"/>
+            <a:off x="1793693" y="1501540"/>
+            <a:ext cx="9527091" cy="1784664"/>
+            <a:chOff x="1793693" y="1501540"/>
+            <a:chExt cx="9527091" cy="1784664"/>
           </a:xfrm>
-          <a:prstGeom prst="roundRect">
-            <a:avLst/>
-          </a:prstGeom>
-        </p:spPr>
-        <p:style>
-          <a:lnRef idx="2">
-            <a:schemeClr val="accent6"/>
-          </a:lnRef>
-          <a:fillRef idx="1">
-            <a:schemeClr val="lt1"/>
-          </a:fillRef>
-          <a:effectRef idx="0">
-            <a:schemeClr val="accent6"/>
-          </a:effectRef>
-          <a:fontRef idx="minor">
-            <a:schemeClr val="dk1"/>
-          </a:fontRef>
-        </p:style>
-        <p:txBody>
-          <a:bodyPr rtlCol="0" anchor="ctr"/>
-          <a:lstStyle/>
-          <a:p>
-            <a:pPr algn="ctr"/>
-            <a:r>
-              <a:rPr lang="en-US" sz="1600" dirty="0" smtClean="0"/>
-              <a:t>Hard Data</a:t>
-            </a:r>
-            <a:endParaRPr lang="en-US" sz="1600" dirty="0"/>
-          </a:p>
-        </p:txBody>
-      </p:sp>
-      <p:sp>
-        <p:nvSpPr>
-          <p:cNvPr id="6" name="Rounded Rectangle 5"/>
-          <p:cNvSpPr/>
-          <p:nvPr/>
-        </p:nvSpPr>
-        <p:spPr>
-          <a:xfrm>
-            <a:off x="2598572" y="2358175"/>
-            <a:ext cx="1068405" cy="462013"/>
-          </a:xfrm>
-          <a:prstGeom prst="roundRect">
-            <a:avLst/>
-          </a:prstGeom>
-        </p:spPr>
-        <p:style>
-          <a:lnRef idx="2">
-            <a:schemeClr val="accent6"/>
-          </a:lnRef>
-          <a:fillRef idx="1">
-            <a:schemeClr val="lt1"/>
-          </a:fillRef>
-          <a:effectRef idx="0">
-            <a:schemeClr val="accent6"/>
-          </a:effectRef>
-          <a:fontRef idx="minor">
-            <a:schemeClr val="dk1"/>
-          </a:fontRef>
-        </p:style>
-        <p:txBody>
-          <a:bodyPr rtlCol="0" anchor="ctr"/>
-          <a:lstStyle/>
-          <a:p>
-            <a:pPr algn="ctr"/>
-            <a:r>
-              <a:rPr lang="en-US" sz="1600" dirty="0" smtClean="0"/>
-              <a:t>Crowdsourcing Data</a:t>
-            </a:r>
-            <a:endParaRPr lang="en-US" sz="1600" dirty="0"/>
-          </a:p>
-        </p:txBody>
-      </p:sp>
-      <p:sp>
-        <p:nvSpPr>
-          <p:cNvPr id="10" name="Rounded Rectangle 9"/>
-          <p:cNvSpPr/>
-          <p:nvPr/>
-        </p:nvSpPr>
-        <p:spPr>
-          <a:xfrm>
-            <a:off x="10087765" y="1896169"/>
-            <a:ext cx="1068405" cy="462013"/>
-          </a:xfrm>
-          <a:prstGeom prst="roundRect">
-            <a:avLst/>
-          </a:prstGeom>
-        </p:spPr>
-        <p:style>
-          <a:lnRef idx="2">
-            <a:schemeClr val="accent6"/>
-          </a:lnRef>
-          <a:fillRef idx="1">
-            <a:schemeClr val="lt1"/>
-          </a:fillRef>
-          <a:effectRef idx="0">
-            <a:schemeClr val="accent6"/>
-          </a:effectRef>
-          <a:fontRef idx="minor">
-            <a:schemeClr val="dk1"/>
-          </a:fontRef>
-        </p:style>
-        <p:txBody>
-          <a:bodyPr rtlCol="0" anchor="ctr"/>
-          <a:lstStyle/>
-          <a:p>
-            <a:pPr algn="ctr"/>
-            <a:r>
-              <a:rPr lang="en-US" sz="1600" dirty="0" smtClean="0"/>
-              <a:t>User</a:t>
-            </a:r>
-          </a:p>
-          <a:p>
-            <a:pPr algn="ctr"/>
-            <a:r>
-              <a:rPr lang="en-US" sz="1600" i="1" dirty="0" smtClean="0"/>
-              <a:t>(Perceive)</a:t>
-            </a:r>
-            <a:endParaRPr lang="en-US" sz="1600" i="1" dirty="0"/>
-          </a:p>
-        </p:txBody>
-      </p:sp>
-      <p:sp>
-        <p:nvSpPr>
-          <p:cNvPr id="11" name="Rounded Rectangle 10"/>
-          <p:cNvSpPr/>
-          <p:nvPr/>
-        </p:nvSpPr>
-        <p:spPr>
-          <a:xfrm>
-            <a:off x="10087764" y="2358182"/>
-            <a:ext cx="1068405" cy="462013"/>
-          </a:xfrm>
-          <a:prstGeom prst="roundRect">
-            <a:avLst/>
-          </a:prstGeom>
-        </p:spPr>
-        <p:style>
-          <a:lnRef idx="2">
-            <a:schemeClr val="accent6"/>
-          </a:lnRef>
-          <a:fillRef idx="1">
-            <a:schemeClr val="lt1"/>
-          </a:fillRef>
-          <a:effectRef idx="0">
-            <a:schemeClr val="accent6"/>
-          </a:effectRef>
-          <a:fontRef idx="minor">
-            <a:schemeClr val="dk1"/>
-          </a:fontRef>
-        </p:style>
-        <p:txBody>
-          <a:bodyPr rtlCol="0" anchor="ctr"/>
-          <a:lstStyle/>
-          <a:p>
-            <a:pPr algn="ctr"/>
-            <a:r>
-              <a:rPr lang="en-US" sz="1600" dirty="0" smtClean="0"/>
-              <a:t>User</a:t>
-            </a:r>
-          </a:p>
-          <a:p>
-            <a:pPr algn="ctr"/>
-            <a:r>
-              <a:rPr lang="en-US" sz="1600" i="1" dirty="0" smtClean="0"/>
-              <a:t>(Interact)</a:t>
-            </a:r>
-            <a:endParaRPr lang="en-US" sz="1600" i="1" dirty="0"/>
-          </a:p>
-        </p:txBody>
-      </p:sp>
-      <p:sp>
-        <p:nvSpPr>
-          <p:cNvPr id="12" name="Rounded Rectangle 11"/>
-          <p:cNvSpPr/>
-          <p:nvPr/>
-        </p:nvSpPr>
-        <p:spPr>
-          <a:xfrm>
-            <a:off x="8236258" y="1896169"/>
-            <a:ext cx="1276954" cy="462014"/>
-          </a:xfrm>
-          <a:prstGeom prst="roundRect">
-            <a:avLst/>
-          </a:prstGeom>
-        </p:spPr>
-        <p:style>
-          <a:lnRef idx="2">
-            <a:schemeClr val="accent6"/>
-          </a:lnRef>
-          <a:fillRef idx="1">
-            <a:schemeClr val="lt1"/>
-          </a:fillRef>
-          <a:effectRef idx="0">
-            <a:schemeClr val="accent6"/>
-          </a:effectRef>
-          <a:fontRef idx="minor">
-            <a:schemeClr val="dk1"/>
-          </a:fontRef>
-        </p:style>
-        <p:txBody>
-          <a:bodyPr rtlCol="0" anchor="ctr"/>
-          <a:lstStyle/>
-          <a:p>
-            <a:pPr algn="ctr"/>
-            <a:r>
-              <a:rPr lang="en-US" sz="1600" dirty="0" smtClean="0"/>
-              <a:t>Visualization</a:t>
-            </a:r>
-            <a:endParaRPr lang="en-US" sz="1600" dirty="0"/>
-          </a:p>
-        </p:txBody>
-      </p:sp>
-      <p:sp>
-        <p:nvSpPr>
-          <p:cNvPr id="14" name="Rounded Rectangle 13"/>
-          <p:cNvSpPr/>
-          <p:nvPr/>
-        </p:nvSpPr>
-        <p:spPr>
-          <a:xfrm>
-            <a:off x="8236258" y="2358182"/>
-            <a:ext cx="1276954" cy="462014"/>
-          </a:xfrm>
-          <a:prstGeom prst="roundRect">
-            <a:avLst/>
-          </a:prstGeom>
-        </p:spPr>
-        <p:style>
-          <a:lnRef idx="2">
-            <a:schemeClr val="accent6"/>
-          </a:lnRef>
-          <a:fillRef idx="1">
-            <a:schemeClr val="lt1"/>
-          </a:fillRef>
-          <a:effectRef idx="0">
-            <a:schemeClr val="accent6"/>
-          </a:effectRef>
-          <a:fontRef idx="minor">
-            <a:schemeClr val="dk1"/>
-          </a:fontRef>
-        </p:style>
-        <p:txBody>
-          <a:bodyPr rtlCol="0" anchor="ctr"/>
-          <a:lstStyle/>
-          <a:p>
-            <a:pPr algn="ctr"/>
-            <a:r>
-              <a:rPr lang="en-US" sz="1600" dirty="0" smtClean="0"/>
-              <a:t>Interaction Interpreter</a:t>
-            </a:r>
-            <a:endParaRPr lang="en-US" sz="1600" dirty="0"/>
-          </a:p>
-        </p:txBody>
-      </p:sp>
-      <p:sp>
-        <p:nvSpPr>
-          <p:cNvPr id="15" name="Rounded Rectangle 14"/>
-          <p:cNvSpPr/>
-          <p:nvPr/>
-        </p:nvSpPr>
-        <p:spPr>
-          <a:xfrm>
-            <a:off x="4241532" y="2367815"/>
-            <a:ext cx="3420173" cy="866274"/>
-          </a:xfrm>
-          <a:prstGeom prst="roundRect">
-            <a:avLst/>
-          </a:prstGeom>
-        </p:spPr>
-        <p:style>
-          <a:lnRef idx="2">
-            <a:schemeClr val="dk1"/>
-          </a:lnRef>
-          <a:fillRef idx="1">
-            <a:schemeClr val="lt1"/>
-          </a:fillRef>
-          <a:effectRef idx="0">
-            <a:schemeClr val="dk1"/>
-          </a:effectRef>
-          <a:fontRef idx="minor">
-            <a:schemeClr val="dk1"/>
-          </a:fontRef>
-        </p:style>
-        <p:txBody>
-          <a:bodyPr rtlCol="0" anchor="ctr"/>
-          <a:lstStyle/>
-          <a:p>
-            <a:pPr algn="ctr"/>
-            <a:r>
-              <a:rPr lang="en-US" sz="1400" dirty="0" smtClean="0"/>
-              <a:t>(create HITS for co-workers)crowd-tasks can create several kinds of m </a:t>
-            </a:r>
-          </a:p>
-          <a:p>
-            <a:pPr algn="ctr"/>
-            <a:r>
-              <a:rPr lang="en-US" sz="1400" dirty="0" err="1" smtClean="0"/>
-              <a:t>icro</a:t>
-            </a:r>
-            <a:r>
-              <a:rPr lang="en-US" sz="1400" dirty="0" smtClean="0"/>
-              <a:t>-tasks</a:t>
-            </a:r>
-            <a:endParaRPr lang="en-US" sz="1400" dirty="0"/>
-          </a:p>
-        </p:txBody>
-      </p:sp>
-      <p:sp>
-        <p:nvSpPr>
-          <p:cNvPr id="16" name="Rounded Rectangle 15"/>
-          <p:cNvSpPr/>
-          <p:nvPr/>
-        </p:nvSpPr>
-        <p:spPr>
-          <a:xfrm>
-            <a:off x="4241531" y="1501540"/>
-            <a:ext cx="3420173" cy="866274"/>
-          </a:xfrm>
-          <a:prstGeom prst="roundRect">
-            <a:avLst/>
-          </a:prstGeom>
-        </p:spPr>
-        <p:style>
-          <a:lnRef idx="2">
-            <a:schemeClr val="dk1"/>
-          </a:lnRef>
-          <a:fillRef idx="1">
-            <a:schemeClr val="lt1"/>
-          </a:fillRef>
-          <a:effectRef idx="0">
-            <a:schemeClr val="dk1"/>
-          </a:effectRef>
-          <a:fontRef idx="minor">
-            <a:schemeClr val="dk1"/>
-          </a:fontRef>
-        </p:style>
-        <p:txBody>
-          <a:bodyPr rtlCol="0" anchor="ctr"/>
-          <a:lstStyle/>
-          <a:p>
-            <a:pPr algn="ctr"/>
-            <a:r>
-              <a:rPr lang="en-US" sz="1400" dirty="0" smtClean="0"/>
-              <a:t>Translate data and crowdsourcing feedbacks </a:t>
-            </a:r>
-            <a:endParaRPr lang="en-US" sz="1400" dirty="0"/>
-          </a:p>
-        </p:txBody>
-      </p:sp>
+        </p:grpSpPr>
+        <p:sp>
+          <p:nvSpPr>
+            <p:cNvPr id="5" name="Rounded Rectangle 4"/>
+            <p:cNvSpPr/>
+            <p:nvPr/>
+          </p:nvSpPr>
+          <p:spPr>
+            <a:xfrm>
+              <a:off x="1793694" y="1897483"/>
+              <a:ext cx="1160991" cy="462013"/>
+            </a:xfrm>
+            <a:prstGeom prst="roundRect">
+              <a:avLst/>
+            </a:prstGeom>
+          </p:spPr>
+          <p:style>
+            <a:lnRef idx="2">
+              <a:schemeClr val="dk1"/>
+            </a:lnRef>
+            <a:fillRef idx="1">
+              <a:schemeClr val="lt1"/>
+            </a:fillRef>
+            <a:effectRef idx="0">
+              <a:schemeClr val="dk1"/>
+            </a:effectRef>
+            <a:fontRef idx="minor">
+              <a:schemeClr val="dk1"/>
+            </a:fontRef>
+          </p:style>
+          <p:txBody>
+            <a:bodyPr rtlCol="0" anchor="ctr"/>
+            <a:lstStyle/>
+            <a:p>
+              <a:pPr algn="ctr"/>
+              <a:r>
+                <a:rPr lang="en-US" sz="1200" dirty="0" smtClean="0"/>
+                <a:t>Data</a:t>
+              </a:r>
+              <a:endParaRPr lang="en-US" sz="1200" dirty="0"/>
+            </a:p>
+          </p:txBody>
+        </p:sp>
+        <p:sp>
+          <p:nvSpPr>
+            <p:cNvPr id="6" name="Rounded Rectangle 5"/>
+            <p:cNvSpPr/>
+            <p:nvPr/>
+          </p:nvSpPr>
+          <p:spPr>
+            <a:xfrm>
+              <a:off x="1793693" y="2359496"/>
+              <a:ext cx="1160992" cy="462013"/>
+            </a:xfrm>
+            <a:prstGeom prst="roundRect">
+              <a:avLst/>
+            </a:prstGeom>
+          </p:spPr>
+          <p:style>
+            <a:lnRef idx="2">
+              <a:schemeClr val="dk1"/>
+            </a:lnRef>
+            <a:fillRef idx="1">
+              <a:schemeClr val="lt1"/>
+            </a:fillRef>
+            <a:effectRef idx="0">
+              <a:schemeClr val="dk1"/>
+            </a:effectRef>
+            <a:fontRef idx="minor">
+              <a:schemeClr val="dk1"/>
+            </a:fontRef>
+          </p:style>
+          <p:txBody>
+            <a:bodyPr rtlCol="0" anchor="ctr"/>
+            <a:lstStyle/>
+            <a:p>
+              <a:pPr algn="ctr"/>
+              <a:r>
+                <a:rPr lang="en-US" sz="1200" dirty="0" smtClean="0"/>
+                <a:t>Crowdsourcing output</a:t>
+              </a:r>
+            </a:p>
+          </p:txBody>
+        </p:sp>
+        <p:sp>
+          <p:nvSpPr>
+            <p:cNvPr id="10" name="Rounded Rectangle 9"/>
+            <p:cNvSpPr/>
+            <p:nvPr/>
+          </p:nvSpPr>
+          <p:spPr>
+            <a:xfrm>
+              <a:off x="10252379" y="1897483"/>
+              <a:ext cx="1068405" cy="462013"/>
+            </a:xfrm>
+            <a:prstGeom prst="roundRect">
+              <a:avLst/>
+            </a:prstGeom>
+          </p:spPr>
+          <p:style>
+            <a:lnRef idx="2">
+              <a:schemeClr val="dk1"/>
+            </a:lnRef>
+            <a:fillRef idx="1">
+              <a:schemeClr val="lt1"/>
+            </a:fillRef>
+            <a:effectRef idx="0">
+              <a:schemeClr val="dk1"/>
+            </a:effectRef>
+            <a:fontRef idx="minor">
+              <a:schemeClr val="dk1"/>
+            </a:fontRef>
+          </p:style>
+          <p:txBody>
+            <a:bodyPr rtlCol="0" anchor="ctr"/>
+            <a:lstStyle/>
+            <a:p>
+              <a:pPr algn="ctr"/>
+              <a:r>
+                <a:rPr lang="en-US" sz="1200" dirty="0" smtClean="0"/>
+                <a:t>User</a:t>
+              </a:r>
+            </a:p>
+            <a:p>
+              <a:pPr algn="ctr"/>
+              <a:r>
+                <a:rPr lang="en-US" sz="1200" i="1" dirty="0" smtClean="0"/>
+                <a:t>(Perceive)</a:t>
+              </a:r>
+              <a:endParaRPr lang="en-US" sz="1200" i="1" dirty="0"/>
+            </a:p>
+          </p:txBody>
+        </p:sp>
+        <p:sp>
+          <p:nvSpPr>
+            <p:cNvPr id="11" name="Rounded Rectangle 10"/>
+            <p:cNvSpPr/>
+            <p:nvPr/>
+          </p:nvSpPr>
+          <p:spPr>
+            <a:xfrm>
+              <a:off x="10252378" y="2359496"/>
+              <a:ext cx="1068405" cy="462013"/>
+            </a:xfrm>
+            <a:prstGeom prst="roundRect">
+              <a:avLst/>
+            </a:prstGeom>
+          </p:spPr>
+          <p:style>
+            <a:lnRef idx="2">
+              <a:schemeClr val="dk1"/>
+            </a:lnRef>
+            <a:fillRef idx="1">
+              <a:schemeClr val="lt1"/>
+            </a:fillRef>
+            <a:effectRef idx="0">
+              <a:schemeClr val="dk1"/>
+            </a:effectRef>
+            <a:fontRef idx="minor">
+              <a:schemeClr val="dk1"/>
+            </a:fontRef>
+          </p:style>
+          <p:txBody>
+            <a:bodyPr rtlCol="0" anchor="ctr"/>
+            <a:lstStyle/>
+            <a:p>
+              <a:pPr algn="ctr"/>
+              <a:r>
+                <a:rPr lang="en-US" sz="1200" dirty="0" smtClean="0"/>
+                <a:t>User</a:t>
+              </a:r>
+            </a:p>
+            <a:p>
+              <a:pPr algn="ctr"/>
+              <a:r>
+                <a:rPr lang="en-US" sz="1200" i="1" dirty="0" smtClean="0"/>
+                <a:t>(Interact)</a:t>
+              </a:r>
+              <a:endParaRPr lang="en-US" sz="1200" i="1" dirty="0"/>
+            </a:p>
+          </p:txBody>
+        </p:sp>
+        <p:sp>
+          <p:nvSpPr>
+            <p:cNvPr id="12" name="Rounded Rectangle 11"/>
+            <p:cNvSpPr/>
+            <p:nvPr/>
+          </p:nvSpPr>
+          <p:spPr>
+            <a:xfrm>
+              <a:off x="8107908" y="1905801"/>
+              <a:ext cx="1276954" cy="462014"/>
+            </a:xfrm>
+            <a:prstGeom prst="roundRect">
+              <a:avLst/>
+            </a:prstGeom>
+          </p:spPr>
+          <p:style>
+            <a:lnRef idx="2">
+              <a:schemeClr val="dk1"/>
+            </a:lnRef>
+            <a:fillRef idx="1">
+              <a:schemeClr val="lt1"/>
+            </a:fillRef>
+            <a:effectRef idx="0">
+              <a:schemeClr val="dk1"/>
+            </a:effectRef>
+            <a:fontRef idx="minor">
+              <a:schemeClr val="dk1"/>
+            </a:fontRef>
+          </p:style>
+          <p:txBody>
+            <a:bodyPr rtlCol="0" anchor="ctr"/>
+            <a:lstStyle/>
+            <a:p>
+              <a:pPr algn="ctr"/>
+              <a:r>
+                <a:rPr lang="en-US" sz="1200" dirty="0" smtClean="0"/>
+                <a:t>Visualization</a:t>
+              </a:r>
+              <a:endParaRPr lang="en-US" sz="1200" dirty="0"/>
+            </a:p>
+          </p:txBody>
+        </p:sp>
+        <p:sp>
+          <p:nvSpPr>
+            <p:cNvPr id="14" name="Rounded Rectangle 13"/>
+            <p:cNvSpPr/>
+            <p:nvPr/>
+          </p:nvSpPr>
+          <p:spPr>
+            <a:xfrm>
+              <a:off x="8107908" y="2367814"/>
+              <a:ext cx="1276954" cy="462014"/>
+            </a:xfrm>
+            <a:prstGeom prst="roundRect">
+              <a:avLst/>
+            </a:prstGeom>
+          </p:spPr>
+          <p:style>
+            <a:lnRef idx="2">
+              <a:schemeClr val="dk1"/>
+            </a:lnRef>
+            <a:fillRef idx="1">
+              <a:schemeClr val="lt1"/>
+            </a:fillRef>
+            <a:effectRef idx="0">
+              <a:schemeClr val="dk1"/>
+            </a:effectRef>
+            <a:fontRef idx="minor">
+              <a:schemeClr val="dk1"/>
+            </a:fontRef>
+          </p:style>
+          <p:txBody>
+            <a:bodyPr rtlCol="0" anchor="ctr"/>
+            <a:lstStyle/>
+            <a:p>
+              <a:pPr algn="ctr"/>
+              <a:r>
+                <a:rPr lang="en-US" sz="1200" dirty="0" smtClean="0"/>
+                <a:t>Interaction Interpreter</a:t>
+              </a:r>
+              <a:endParaRPr lang="en-US" sz="1200" dirty="0"/>
+            </a:p>
+          </p:txBody>
+        </p:sp>
+        <p:sp>
+          <p:nvSpPr>
+            <p:cNvPr id="15" name="Rounded Rectangle 14"/>
+            <p:cNvSpPr/>
+            <p:nvPr/>
+          </p:nvSpPr>
+          <p:spPr>
+            <a:xfrm>
+              <a:off x="3820218" y="2367815"/>
+              <a:ext cx="3420173" cy="866274"/>
+            </a:xfrm>
+            <a:prstGeom prst="roundRect">
+              <a:avLst/>
+            </a:prstGeom>
+          </p:spPr>
+          <p:style>
+            <a:lnRef idx="2">
+              <a:schemeClr val="dk1"/>
+            </a:lnRef>
+            <a:fillRef idx="1">
+              <a:schemeClr val="lt1"/>
+            </a:fillRef>
+            <a:effectRef idx="0">
+              <a:schemeClr val="dk1"/>
+            </a:effectRef>
+            <a:fontRef idx="minor">
+              <a:schemeClr val="dk1"/>
+            </a:fontRef>
+          </p:style>
+          <p:txBody>
+            <a:bodyPr rtlCol="0" anchor="b"/>
+            <a:lstStyle/>
+            <a:p>
+              <a:pPr algn="ctr"/>
+              <a:r>
+                <a:rPr lang="en-US" sz="1200" dirty="0" smtClean="0"/>
+                <a:t>Human Computation Systems</a:t>
+              </a:r>
+              <a:endParaRPr lang="en-US" sz="1200" dirty="0"/>
+            </a:p>
+          </p:txBody>
+        </p:sp>
+        <p:sp>
+          <p:nvSpPr>
+            <p:cNvPr id="16" name="Rounded Rectangle 15"/>
+            <p:cNvSpPr/>
+            <p:nvPr/>
+          </p:nvSpPr>
+          <p:spPr>
+            <a:xfrm>
+              <a:off x="3820217" y="1501540"/>
+              <a:ext cx="3420173" cy="866274"/>
+            </a:xfrm>
+            <a:prstGeom prst="roundRect">
+              <a:avLst/>
+            </a:prstGeom>
+          </p:spPr>
+          <p:style>
+            <a:lnRef idx="2">
+              <a:schemeClr val="dk1"/>
+            </a:lnRef>
+            <a:fillRef idx="1">
+              <a:schemeClr val="lt1"/>
+            </a:fillRef>
+            <a:effectRef idx="0">
+              <a:schemeClr val="dk1"/>
+            </a:effectRef>
+            <a:fontRef idx="minor">
+              <a:schemeClr val="dk1"/>
+            </a:fontRef>
+          </p:style>
+          <p:txBody>
+            <a:bodyPr rtlCol="0" anchor="b"/>
+            <a:lstStyle/>
+            <a:p>
+              <a:pPr algn="ctr"/>
+              <a:r>
+                <a:rPr lang="en-US" sz="1200" dirty="0" smtClean="0"/>
+                <a:t>Project Algorithms</a:t>
+              </a:r>
+              <a:endParaRPr lang="en-US" sz="1200" dirty="0"/>
+            </a:p>
+          </p:txBody>
+        </p:sp>
+        <p:pic>
+          <p:nvPicPr>
+            <p:cNvPr id="28" name="Picture 27"/>
+            <p:cNvPicPr>
+              <a:picLocks noChangeAspect="1"/>
+            </p:cNvPicPr>
+            <p:nvPr/>
+          </p:nvPicPr>
+          <p:blipFill>
+            <a:blip r:embed="rId2">
+              <a:extLst>
+                <a:ext uri="{28A0092B-C50C-407E-A947-70E740481C1C}">
+                  <a14:useLocalDpi xmlns:a14="http://schemas.microsoft.com/office/drawing/2010/main" val="0"/>
+                </a:ext>
+              </a:extLst>
+            </a:blip>
+            <a:stretch>
+              <a:fillRect/>
+            </a:stretch>
+          </p:blipFill>
+          <p:spPr>
+            <a:xfrm>
+              <a:off x="3073853" y="2761075"/>
+              <a:ext cx="525129" cy="525129"/>
+            </a:xfrm>
+            <a:prstGeom prst="rect">
+              <a:avLst/>
+            </a:prstGeom>
+          </p:spPr>
+        </p:pic>
+        <p:cxnSp>
+          <p:nvCxnSpPr>
+            <p:cNvPr id="30" name="Straight Arrow Connector 29"/>
+            <p:cNvCxnSpPr>
+              <a:stCxn id="15" idx="1"/>
+              <a:endCxn id="6" idx="3"/>
+            </p:cNvCxnSpPr>
+            <p:nvPr/>
+          </p:nvCxnSpPr>
+          <p:spPr>
+            <a:xfrm flipH="1" flipV="1">
+              <a:off x="2954685" y="2590503"/>
+              <a:ext cx="865533" cy="210449"/>
+            </a:xfrm>
+            <a:prstGeom prst="straightConnector1">
+              <a:avLst/>
+            </a:prstGeom>
+            <a:ln>
+              <a:solidFill>
+                <a:srgbClr val="FF0000"/>
+              </a:solidFill>
+              <a:tailEnd type="triangle"/>
+            </a:ln>
+          </p:spPr>
+          <p:style>
+            <a:lnRef idx="1">
+              <a:schemeClr val="accent1"/>
+            </a:lnRef>
+            <a:fillRef idx="0">
+              <a:schemeClr val="accent1"/>
+            </a:fillRef>
+            <a:effectRef idx="0">
+              <a:schemeClr val="accent1"/>
+            </a:effectRef>
+            <a:fontRef idx="minor">
+              <a:schemeClr val="tx1"/>
+            </a:fontRef>
+          </p:style>
+        </p:cxnSp>
+        <p:cxnSp>
+          <p:nvCxnSpPr>
+            <p:cNvPr id="33" name="Straight Arrow Connector 32"/>
+            <p:cNvCxnSpPr>
+              <a:stCxn id="14" idx="1"/>
+              <a:endCxn id="15" idx="3"/>
+            </p:cNvCxnSpPr>
+            <p:nvPr/>
+          </p:nvCxnSpPr>
+          <p:spPr>
+            <a:xfrm flipH="1">
+              <a:off x="7240391" y="2598821"/>
+              <a:ext cx="867517" cy="202131"/>
+            </a:xfrm>
+            <a:prstGeom prst="straightConnector1">
+              <a:avLst/>
+            </a:prstGeom>
+            <a:ln>
+              <a:solidFill>
+                <a:srgbClr val="FF0000"/>
+              </a:solidFill>
+              <a:tailEnd type="triangle"/>
+            </a:ln>
+          </p:spPr>
+          <p:style>
+            <a:lnRef idx="1">
+              <a:schemeClr val="accent1"/>
+            </a:lnRef>
+            <a:fillRef idx="0">
+              <a:schemeClr val="accent1"/>
+            </a:fillRef>
+            <a:effectRef idx="0">
+              <a:schemeClr val="accent1"/>
+            </a:effectRef>
+            <a:fontRef idx="minor">
+              <a:schemeClr val="tx1"/>
+            </a:fontRef>
+          </p:style>
+        </p:cxnSp>
+        <mc:AlternateContent xmlns:mc="http://schemas.openxmlformats.org/markup-compatibility/2006">
+          <mc:Choice xmlns:a14="http://schemas.microsoft.com/office/drawing/2010/main" Requires="a14">
+            <p:sp>
+              <p:nvSpPr>
+                <p:cNvPr id="34" name="Rectangle 33"/>
+                <p:cNvSpPr/>
+                <p:nvPr/>
+              </p:nvSpPr>
+              <p:spPr>
+                <a:xfrm>
+                  <a:off x="4041454" y="2473569"/>
+                  <a:ext cx="633974" cy="404446"/>
+                </a:xfrm>
+                <a:prstGeom prst="rect">
+                  <a:avLst/>
+                </a:prstGeom>
+              </p:spPr>
+              <p:style>
+                <a:lnRef idx="2">
+                  <a:schemeClr val="dk1"/>
+                </a:lnRef>
+                <a:fillRef idx="1">
+                  <a:schemeClr val="lt1"/>
+                </a:fillRef>
+                <a:effectRef idx="0">
+                  <a:schemeClr val="dk1"/>
+                </a:effectRef>
+                <a:fontRef idx="minor">
+                  <a:schemeClr val="dk1"/>
+                </a:fontRef>
+              </p:style>
+              <p:txBody>
+                <a:bodyPr rtlCol="0" anchor="ctr"/>
+                <a:lstStyle/>
+                <a:p>
+                  <a:pPr algn="ctr"/>
+                  <a14:m>
+                    <m:oMathPara xmlns:m="http://schemas.openxmlformats.org/officeDocument/2006/math">
+                      <m:oMathParaPr>
+                        <m:jc m:val="center"/>
+                      </m:oMathParaPr>
+                      <m:oMath xmlns:m="http://schemas.openxmlformats.org/officeDocument/2006/math">
+                        <m:sSub>
+                          <m:sSubPr>
+                            <m:ctrlPr>
+                              <a:rPr lang="en-US" sz="1200" i="1" smtClean="0">
+                                <a:latin typeface="Cambria Math" charset="0"/>
+                              </a:rPr>
+                            </m:ctrlPr>
+                          </m:sSubPr>
+                          <m:e>
+                            <m:r>
+                              <a:rPr lang="en-US" sz="1200" b="0" i="1" smtClean="0">
+                                <a:latin typeface="Cambria Math" charset="0"/>
+                              </a:rPr>
+                              <m:t>𝑡𝑎𝑠𝑘</m:t>
+                            </m:r>
+                          </m:e>
+                          <m:sub>
+                            <m:r>
+                              <a:rPr lang="en-US" sz="1200" b="0" i="1" smtClean="0">
+                                <a:latin typeface="Cambria Math" charset="0"/>
+                              </a:rPr>
+                              <m:t>1</m:t>
+                            </m:r>
+                          </m:sub>
+                        </m:sSub>
+                      </m:oMath>
+                    </m:oMathPara>
+                  </a14:m>
+                  <a:endParaRPr lang="en-US" sz="1200" dirty="0"/>
+                </a:p>
+              </p:txBody>
+            </p:sp>
+          </mc:Choice>
+          <mc:Fallback>
+            <p:sp>
+              <p:nvSpPr>
+                <p:cNvPr id="34" name="Rectangle 33"/>
+                <p:cNvSpPr>
+                  <a:spLocks noRot="1" noChangeAspect="1" noMove="1" noResize="1" noEditPoints="1" noAdjustHandles="1" noChangeArrowheads="1" noChangeShapeType="1" noTextEdit="1"/>
+                </p:cNvSpPr>
+                <p:nvPr/>
+              </p:nvSpPr>
+              <p:spPr>
+                <a:xfrm>
+                  <a:off x="4041454" y="2473569"/>
+                  <a:ext cx="633974" cy="404446"/>
+                </a:xfrm>
+                <a:prstGeom prst="rect">
+                  <a:avLst/>
+                </a:prstGeom>
+                <a:blipFill rotWithShape="0">
+                  <a:blip r:embed="rId3"/>
+                  <a:stretch>
+                    <a:fillRect/>
+                  </a:stretch>
+                </a:blipFill>
+              </p:spPr>
+              <p:txBody>
+                <a:bodyPr/>
+                <a:lstStyle/>
+                <a:p>
+                  <a:r>
+                    <a:rPr lang="en-US">
+                      <a:noFill/>
+                    </a:rPr>
+                    <a:t> </a:t>
+                  </a:r>
+                </a:p>
+              </p:txBody>
+            </p:sp>
+          </mc:Fallback>
+        </mc:AlternateContent>
+        <p:sp>
+          <p:nvSpPr>
+            <p:cNvPr id="36" name="Rectangle 35"/>
+            <p:cNvSpPr/>
+            <p:nvPr/>
+          </p:nvSpPr>
+          <p:spPr>
+            <a:xfrm>
+              <a:off x="5815320" y="2473569"/>
+              <a:ext cx="353460" cy="404446"/>
+            </a:xfrm>
+            <a:prstGeom prst="rect">
+              <a:avLst/>
+            </a:prstGeom>
+          </p:spPr>
+          <p:style>
+            <a:lnRef idx="2">
+              <a:schemeClr val="dk1"/>
+            </a:lnRef>
+            <a:fillRef idx="1">
+              <a:schemeClr val="lt1"/>
+            </a:fillRef>
+            <a:effectRef idx="0">
+              <a:schemeClr val="dk1"/>
+            </a:effectRef>
+            <a:fontRef idx="minor">
+              <a:schemeClr val="dk1"/>
+            </a:fontRef>
+          </p:style>
+          <p:txBody>
+            <a:bodyPr lIns="0" rIns="0" rtlCol="0" anchor="ctr"/>
+            <a:lstStyle/>
+            <a:p>
+              <a:pPr algn="ctr"/>
+              <a:r>
+                <a:rPr lang="en-US" sz="1200" smtClean="0"/>
+                <a:t>...</a:t>
+              </a:r>
+              <a:endParaRPr lang="en-US" sz="1200" dirty="0"/>
+            </a:p>
+          </p:txBody>
+        </p:sp>
+        <mc:AlternateContent xmlns:mc="http://schemas.openxmlformats.org/markup-compatibility/2006">
+          <mc:Choice xmlns:a14="http://schemas.microsoft.com/office/drawing/2010/main" Requires="a14">
+            <p:sp>
+              <p:nvSpPr>
+                <p:cNvPr id="38" name="Rectangle 37"/>
+                <p:cNvSpPr/>
+                <p:nvPr/>
+              </p:nvSpPr>
+              <p:spPr>
+                <a:xfrm>
+                  <a:off x="4930954" y="2473569"/>
+                  <a:ext cx="633974" cy="404446"/>
+                </a:xfrm>
+                <a:prstGeom prst="rect">
+                  <a:avLst/>
+                </a:prstGeom>
+              </p:spPr>
+              <p:style>
+                <a:lnRef idx="2">
+                  <a:schemeClr val="dk1"/>
+                </a:lnRef>
+                <a:fillRef idx="1">
+                  <a:schemeClr val="lt1"/>
+                </a:fillRef>
+                <a:effectRef idx="0">
+                  <a:schemeClr val="dk1"/>
+                </a:effectRef>
+                <a:fontRef idx="minor">
+                  <a:schemeClr val="dk1"/>
+                </a:fontRef>
+              </p:style>
+              <p:txBody>
+                <a:bodyPr rtlCol="0" anchor="ctr"/>
+                <a:lstStyle/>
+                <a:p>
+                  <a:pPr algn="ctr"/>
+                  <a14:m>
+                    <m:oMathPara xmlns:m="http://schemas.openxmlformats.org/officeDocument/2006/math">
+                      <m:oMathParaPr>
+                        <m:jc m:val="center"/>
+                      </m:oMathParaPr>
+                      <m:oMath xmlns:m="http://schemas.openxmlformats.org/officeDocument/2006/math">
+                        <m:sSub>
+                          <m:sSubPr>
+                            <m:ctrlPr>
+                              <a:rPr lang="en-US" sz="1200" i="1" smtClean="0">
+                                <a:latin typeface="Cambria Math" charset="0"/>
+                              </a:rPr>
+                            </m:ctrlPr>
+                          </m:sSubPr>
+                          <m:e>
+                            <m:r>
+                              <a:rPr lang="en-US" sz="1200" b="0" i="1" smtClean="0">
+                                <a:latin typeface="Cambria Math" charset="0"/>
+                              </a:rPr>
+                              <m:t>𝑡𝑎𝑠𝑘</m:t>
+                            </m:r>
+                          </m:e>
+                          <m:sub>
+                            <m:r>
+                              <a:rPr lang="en-US" sz="1200" b="0" i="1" smtClean="0">
+                                <a:latin typeface="Cambria Math" charset="0"/>
+                              </a:rPr>
+                              <m:t>2</m:t>
+                            </m:r>
+                          </m:sub>
+                        </m:sSub>
+                      </m:oMath>
+                    </m:oMathPara>
+                  </a14:m>
+                  <a:endParaRPr lang="en-US" sz="1200" dirty="0"/>
+                </a:p>
+              </p:txBody>
+            </p:sp>
+          </mc:Choice>
+          <mc:Fallback>
+            <p:sp>
+              <p:nvSpPr>
+                <p:cNvPr id="38" name="Rectangle 37"/>
+                <p:cNvSpPr>
+                  <a:spLocks noRot="1" noChangeAspect="1" noMove="1" noResize="1" noEditPoints="1" noAdjustHandles="1" noChangeArrowheads="1" noChangeShapeType="1" noTextEdit="1"/>
+                </p:cNvSpPr>
+                <p:nvPr/>
+              </p:nvSpPr>
+              <p:spPr>
+                <a:xfrm>
+                  <a:off x="4930954" y="2473569"/>
+                  <a:ext cx="633974" cy="404446"/>
+                </a:xfrm>
+                <a:prstGeom prst="rect">
+                  <a:avLst/>
+                </a:prstGeom>
+                <a:blipFill rotWithShape="0">
+                  <a:blip r:embed="rId4"/>
+                  <a:stretch>
+                    <a:fillRect/>
+                  </a:stretch>
+                </a:blipFill>
+              </p:spPr>
+              <p:txBody>
+                <a:bodyPr/>
+                <a:lstStyle/>
+                <a:p>
+                  <a:r>
+                    <a:rPr lang="en-US">
+                      <a:noFill/>
+                    </a:rPr>
+                    <a:t> </a:t>
+                  </a:r>
+                </a:p>
+              </p:txBody>
+            </p:sp>
+          </mc:Fallback>
+        </mc:AlternateContent>
+        <mc:AlternateContent xmlns:mc="http://schemas.openxmlformats.org/markup-compatibility/2006">
+          <mc:Choice xmlns:a14="http://schemas.microsoft.com/office/drawing/2010/main" Requires="a14">
+            <p:sp>
+              <p:nvSpPr>
+                <p:cNvPr id="39" name="Rectangle 38"/>
+                <p:cNvSpPr/>
+                <p:nvPr/>
+              </p:nvSpPr>
+              <p:spPr>
+                <a:xfrm>
+                  <a:off x="6424306" y="2473569"/>
+                  <a:ext cx="633974" cy="404446"/>
+                </a:xfrm>
+                <a:prstGeom prst="rect">
+                  <a:avLst/>
+                </a:prstGeom>
+              </p:spPr>
+              <p:style>
+                <a:lnRef idx="2">
+                  <a:schemeClr val="dk1"/>
+                </a:lnRef>
+                <a:fillRef idx="1">
+                  <a:schemeClr val="lt1"/>
+                </a:fillRef>
+                <a:effectRef idx="0">
+                  <a:schemeClr val="dk1"/>
+                </a:effectRef>
+                <a:fontRef idx="minor">
+                  <a:schemeClr val="dk1"/>
+                </a:fontRef>
+              </p:style>
+              <p:txBody>
+                <a:bodyPr rtlCol="0" anchor="ctr"/>
+                <a:lstStyle/>
+                <a:p>
+                  <a:pPr algn="ctr"/>
+                  <a14:m>
+                    <m:oMathPara xmlns:m="http://schemas.openxmlformats.org/officeDocument/2006/math">
+                      <m:oMathParaPr>
+                        <m:jc m:val="center"/>
+                      </m:oMathParaPr>
+                      <m:oMath xmlns:m="http://schemas.openxmlformats.org/officeDocument/2006/math">
+                        <m:sSub>
+                          <m:sSubPr>
+                            <m:ctrlPr>
+                              <a:rPr lang="en-US" sz="1200" i="1" smtClean="0">
+                                <a:latin typeface="Cambria Math" charset="0"/>
+                              </a:rPr>
+                            </m:ctrlPr>
+                          </m:sSubPr>
+                          <m:e>
+                            <m:r>
+                              <a:rPr lang="en-US" sz="1200" b="0" i="1" smtClean="0">
+                                <a:latin typeface="Cambria Math" charset="0"/>
+                              </a:rPr>
+                              <m:t>𝑡𝑎𝑠𝑘</m:t>
+                            </m:r>
+                          </m:e>
+                          <m:sub>
+                            <m:r>
+                              <a:rPr lang="en-US" sz="1200" b="0" i="1" smtClean="0">
+                                <a:latin typeface="Cambria Math" charset="0"/>
+                              </a:rPr>
+                              <m:t>𝑛</m:t>
+                            </m:r>
+                          </m:sub>
+                        </m:sSub>
+                      </m:oMath>
+                    </m:oMathPara>
+                  </a14:m>
+                  <a:endParaRPr lang="en-US" sz="1200" dirty="0"/>
+                </a:p>
+              </p:txBody>
+            </p:sp>
+          </mc:Choice>
+          <mc:Fallback>
+            <p:sp>
+              <p:nvSpPr>
+                <p:cNvPr id="39" name="Rectangle 38"/>
+                <p:cNvSpPr>
+                  <a:spLocks noRot="1" noChangeAspect="1" noMove="1" noResize="1" noEditPoints="1" noAdjustHandles="1" noChangeArrowheads="1" noChangeShapeType="1" noTextEdit="1"/>
+                </p:cNvSpPr>
+                <p:nvPr/>
+              </p:nvSpPr>
+              <p:spPr>
+                <a:xfrm>
+                  <a:off x="6424306" y="2473569"/>
+                  <a:ext cx="633974" cy="404446"/>
+                </a:xfrm>
+                <a:prstGeom prst="rect">
+                  <a:avLst/>
+                </a:prstGeom>
+                <a:blipFill rotWithShape="0">
+                  <a:blip r:embed="rId5"/>
+                  <a:stretch>
+                    <a:fillRect/>
+                  </a:stretch>
+                </a:blipFill>
+              </p:spPr>
+              <p:txBody>
+                <a:bodyPr/>
+                <a:lstStyle/>
+                <a:p>
+                  <a:r>
+                    <a:rPr lang="en-US">
+                      <a:noFill/>
+                    </a:rPr>
+                    <a:t> </a:t>
+                  </a:r>
+                </a:p>
+              </p:txBody>
+            </p:sp>
+          </mc:Fallback>
+        </mc:AlternateContent>
+        <p:cxnSp>
+          <p:nvCxnSpPr>
+            <p:cNvPr id="44" name="Straight Arrow Connector 43"/>
+            <p:cNvCxnSpPr>
+              <a:stCxn id="11" idx="1"/>
+              <a:endCxn id="14" idx="3"/>
+            </p:cNvCxnSpPr>
+            <p:nvPr/>
+          </p:nvCxnSpPr>
+          <p:spPr>
+            <a:xfrm flipH="1">
+              <a:off x="9384862" y="2590503"/>
+              <a:ext cx="867516" cy="8318"/>
+            </a:xfrm>
+            <a:prstGeom prst="straightConnector1">
+              <a:avLst/>
+            </a:prstGeom>
+            <a:ln>
+              <a:solidFill>
+                <a:srgbClr val="FF0000"/>
+              </a:solidFill>
+              <a:tailEnd type="triangle"/>
+            </a:ln>
+          </p:spPr>
+          <p:style>
+            <a:lnRef idx="1">
+              <a:schemeClr val="accent1"/>
+            </a:lnRef>
+            <a:fillRef idx="0">
+              <a:schemeClr val="accent1"/>
+            </a:fillRef>
+            <a:effectRef idx="0">
+              <a:schemeClr val="accent1"/>
+            </a:effectRef>
+            <a:fontRef idx="minor">
+              <a:schemeClr val="tx1"/>
+            </a:fontRef>
+          </p:style>
+        </p:cxnSp>
+        <p:cxnSp>
+          <p:nvCxnSpPr>
+            <p:cNvPr id="46" name="Straight Arrow Connector 45"/>
+            <p:cNvCxnSpPr>
+              <a:stCxn id="12" idx="3"/>
+              <a:endCxn id="10" idx="1"/>
+            </p:cNvCxnSpPr>
+            <p:nvPr/>
+          </p:nvCxnSpPr>
+          <p:spPr>
+            <a:xfrm flipV="1">
+              <a:off x="9384862" y="2128490"/>
+              <a:ext cx="867517" cy="8318"/>
+            </a:xfrm>
+            <a:prstGeom prst="straightConnector1">
+              <a:avLst/>
+            </a:prstGeom>
+            <a:ln>
+              <a:solidFill>
+                <a:schemeClr val="tx1"/>
+              </a:solidFill>
+              <a:tailEnd type="triangle"/>
+            </a:ln>
+          </p:spPr>
+          <p:style>
+            <a:lnRef idx="1">
+              <a:schemeClr val="accent1"/>
+            </a:lnRef>
+            <a:fillRef idx="0">
+              <a:schemeClr val="accent1"/>
+            </a:fillRef>
+            <a:effectRef idx="0">
+              <a:schemeClr val="accent1"/>
+            </a:effectRef>
+            <a:fontRef idx="minor">
+              <a:schemeClr val="tx1"/>
+            </a:fontRef>
+          </p:style>
+        </p:cxnSp>
+        <p:cxnSp>
+          <p:nvCxnSpPr>
+            <p:cNvPr id="48" name="Straight Arrow Connector 47"/>
+            <p:cNvCxnSpPr>
+              <a:stCxn id="5" idx="3"/>
+              <a:endCxn id="16" idx="1"/>
+            </p:cNvCxnSpPr>
+            <p:nvPr/>
+          </p:nvCxnSpPr>
+          <p:spPr>
+            <a:xfrm flipV="1">
+              <a:off x="2954685" y="1934677"/>
+              <a:ext cx="865532" cy="193813"/>
+            </a:xfrm>
+            <a:prstGeom prst="straightConnector1">
+              <a:avLst/>
+            </a:prstGeom>
+            <a:ln>
+              <a:solidFill>
+                <a:schemeClr val="tx1"/>
+              </a:solidFill>
+              <a:tailEnd type="triangle"/>
+            </a:ln>
+          </p:spPr>
+          <p:style>
+            <a:lnRef idx="1">
+              <a:schemeClr val="accent1"/>
+            </a:lnRef>
+            <a:fillRef idx="0">
+              <a:schemeClr val="accent1"/>
+            </a:fillRef>
+            <a:effectRef idx="0">
+              <a:schemeClr val="accent1"/>
+            </a:effectRef>
+            <a:fontRef idx="minor">
+              <a:schemeClr val="tx1"/>
+            </a:fontRef>
+          </p:style>
+        </p:cxnSp>
+        <p:cxnSp>
+          <p:nvCxnSpPr>
+            <p:cNvPr id="50" name="Straight Arrow Connector 49"/>
+            <p:cNvCxnSpPr>
+              <a:stCxn id="6" idx="3"/>
+              <a:endCxn id="16" idx="1"/>
+            </p:cNvCxnSpPr>
+            <p:nvPr/>
+          </p:nvCxnSpPr>
+          <p:spPr>
+            <a:xfrm flipV="1">
+              <a:off x="2954685" y="1934677"/>
+              <a:ext cx="865532" cy="655826"/>
+            </a:xfrm>
+            <a:prstGeom prst="straightConnector1">
+              <a:avLst/>
+            </a:prstGeom>
+            <a:ln>
+              <a:solidFill>
+                <a:srgbClr val="FF0000"/>
+              </a:solidFill>
+              <a:tailEnd type="triangle"/>
+            </a:ln>
+          </p:spPr>
+          <p:style>
+            <a:lnRef idx="1">
+              <a:schemeClr val="accent1"/>
+            </a:lnRef>
+            <a:fillRef idx="0">
+              <a:schemeClr val="accent1"/>
+            </a:fillRef>
+            <a:effectRef idx="0">
+              <a:schemeClr val="accent1"/>
+            </a:effectRef>
+            <a:fontRef idx="minor">
+              <a:schemeClr val="tx1"/>
+            </a:fontRef>
+          </p:style>
+        </p:cxnSp>
+        <p:cxnSp>
+          <p:nvCxnSpPr>
+            <p:cNvPr id="52" name="Straight Arrow Connector 51"/>
+            <p:cNvCxnSpPr>
+              <a:stCxn id="16" idx="3"/>
+              <a:endCxn id="12" idx="1"/>
+            </p:cNvCxnSpPr>
+            <p:nvPr/>
+          </p:nvCxnSpPr>
+          <p:spPr>
+            <a:xfrm>
+              <a:off x="7240390" y="1934677"/>
+              <a:ext cx="867518" cy="202131"/>
+            </a:xfrm>
+            <a:prstGeom prst="straightConnector1">
+              <a:avLst/>
+            </a:prstGeom>
+            <a:ln>
+              <a:solidFill>
+                <a:schemeClr val="tx1"/>
+              </a:solidFill>
+              <a:tailEnd type="triangle"/>
+            </a:ln>
+          </p:spPr>
+          <p:style>
+            <a:lnRef idx="1">
+              <a:schemeClr val="accent1"/>
+            </a:lnRef>
+            <a:fillRef idx="0">
+              <a:schemeClr val="accent1"/>
+            </a:fillRef>
+            <a:effectRef idx="0">
+              <a:schemeClr val="accent1"/>
+            </a:effectRef>
+            <a:fontRef idx="minor">
+              <a:schemeClr val="tx1"/>
+            </a:fontRef>
+          </p:style>
+        </p:cxnSp>
+        <mc:AlternateContent xmlns:mc="http://schemas.openxmlformats.org/markup-compatibility/2006">
+          <mc:Choice xmlns:a14="http://schemas.microsoft.com/office/drawing/2010/main" Requires="a14">
+            <p:sp>
+              <p:nvSpPr>
+                <p:cNvPr id="53" name="Rectangle 52"/>
+                <p:cNvSpPr/>
+                <p:nvPr/>
+              </p:nvSpPr>
+              <p:spPr>
+                <a:xfrm>
+                  <a:off x="4043282" y="1607295"/>
+                  <a:ext cx="633974" cy="404446"/>
+                </a:xfrm>
+                <a:prstGeom prst="rect">
+                  <a:avLst/>
+                </a:prstGeom>
+              </p:spPr>
+              <p:style>
+                <a:lnRef idx="2">
+                  <a:schemeClr val="dk1"/>
+                </a:lnRef>
+                <a:fillRef idx="1">
+                  <a:schemeClr val="lt1"/>
+                </a:fillRef>
+                <a:effectRef idx="0">
+                  <a:schemeClr val="dk1"/>
+                </a:effectRef>
+                <a:fontRef idx="minor">
+                  <a:schemeClr val="dk1"/>
+                </a:fontRef>
+              </p:style>
+              <p:txBody>
+                <a:bodyPr rtlCol="0" anchor="ctr"/>
+                <a:lstStyle/>
+                <a:p>
+                  <a:pPr algn="ctr"/>
+                  <a14:m>
+                    <m:oMathPara xmlns:m="http://schemas.openxmlformats.org/officeDocument/2006/math">
+                      <m:oMathParaPr>
+                        <m:jc m:val="center"/>
+                      </m:oMathParaPr>
+                      <m:oMath xmlns:m="http://schemas.openxmlformats.org/officeDocument/2006/math">
+                        <m:sSub>
+                          <m:sSubPr>
+                            <m:ctrlPr>
+                              <a:rPr lang="en-US" sz="1200" i="1" smtClean="0">
+                                <a:latin typeface="Cambria Math" charset="0"/>
+                              </a:rPr>
+                            </m:ctrlPr>
+                          </m:sSubPr>
+                          <m:e>
+                            <m:r>
+                              <a:rPr lang="en-US" sz="1200" b="0" i="1" smtClean="0">
+                                <a:latin typeface="Cambria Math" charset="0"/>
+                              </a:rPr>
+                              <m:t>𝑃𝑟𝑜𝑗𝑒𝑐𝑡</m:t>
+                            </m:r>
+                          </m:e>
+                          <m:sub>
+                            <m:r>
+                              <a:rPr lang="en-US" sz="1200" b="0" i="1" smtClean="0">
+                                <a:latin typeface="Cambria Math" charset="0"/>
+                              </a:rPr>
+                              <m:t>1</m:t>
+                            </m:r>
+                          </m:sub>
+                        </m:sSub>
+                      </m:oMath>
+                    </m:oMathPara>
+                  </a14:m>
+                  <a:endParaRPr lang="en-US" sz="1200" dirty="0"/>
+                </a:p>
+              </p:txBody>
+            </p:sp>
+          </mc:Choice>
+          <mc:Fallback>
+            <p:sp>
+              <p:nvSpPr>
+                <p:cNvPr id="53" name="Rectangle 52"/>
+                <p:cNvSpPr>
+                  <a:spLocks noRot="1" noChangeAspect="1" noMove="1" noResize="1" noEditPoints="1" noAdjustHandles="1" noChangeArrowheads="1" noChangeShapeType="1" noTextEdit="1"/>
+                </p:cNvSpPr>
+                <p:nvPr/>
+              </p:nvSpPr>
+              <p:spPr>
+                <a:xfrm>
+                  <a:off x="4043282" y="1607295"/>
+                  <a:ext cx="633974" cy="404446"/>
+                </a:xfrm>
+                <a:prstGeom prst="rect">
+                  <a:avLst/>
+                </a:prstGeom>
+                <a:blipFill rotWithShape="0">
+                  <a:blip r:embed="rId6"/>
+                  <a:stretch>
+                    <a:fillRect l="-8491"/>
+                  </a:stretch>
+                </a:blipFill>
+              </p:spPr>
+              <p:txBody>
+                <a:bodyPr/>
+                <a:lstStyle/>
+                <a:p>
+                  <a:r>
+                    <a:rPr lang="en-US">
+                      <a:noFill/>
+                    </a:rPr>
+                    <a:t> </a:t>
+                  </a:r>
+                </a:p>
+              </p:txBody>
+            </p:sp>
+          </mc:Fallback>
+        </mc:AlternateContent>
+        <mc:AlternateContent xmlns:mc="http://schemas.openxmlformats.org/markup-compatibility/2006">
+          <mc:Choice xmlns:a14="http://schemas.microsoft.com/office/drawing/2010/main" Requires="a14">
+            <p:sp>
+              <p:nvSpPr>
+                <p:cNvPr id="54" name="Rectangle 53"/>
+                <p:cNvSpPr/>
+                <p:nvPr/>
+              </p:nvSpPr>
+              <p:spPr>
+                <a:xfrm>
+                  <a:off x="4930954" y="1607295"/>
+                  <a:ext cx="633974" cy="404446"/>
+                </a:xfrm>
+                <a:prstGeom prst="rect">
+                  <a:avLst/>
+                </a:prstGeom>
+              </p:spPr>
+              <p:style>
+                <a:lnRef idx="2">
+                  <a:schemeClr val="dk1"/>
+                </a:lnRef>
+                <a:fillRef idx="1">
+                  <a:schemeClr val="lt1"/>
+                </a:fillRef>
+                <a:effectRef idx="0">
+                  <a:schemeClr val="dk1"/>
+                </a:effectRef>
+                <a:fontRef idx="minor">
+                  <a:schemeClr val="dk1"/>
+                </a:fontRef>
+              </p:style>
+              <p:txBody>
+                <a:bodyPr rtlCol="0" anchor="ctr"/>
+                <a:lstStyle/>
+                <a:p>
+                  <a:pPr algn="ctr"/>
+                  <a14:m>
+                    <m:oMathPara xmlns:m="http://schemas.openxmlformats.org/officeDocument/2006/math">
+                      <m:oMathParaPr>
+                        <m:jc m:val="center"/>
+                      </m:oMathParaPr>
+                      <m:oMath xmlns:m="http://schemas.openxmlformats.org/officeDocument/2006/math">
+                        <m:sSub>
+                          <m:sSubPr>
+                            <m:ctrlPr>
+                              <a:rPr lang="en-US" sz="1200" i="1" smtClean="0">
+                                <a:latin typeface="Cambria Math" charset="0"/>
+                              </a:rPr>
+                            </m:ctrlPr>
+                          </m:sSubPr>
+                          <m:e>
+                            <m:r>
+                              <a:rPr lang="en-US" sz="1200" b="0" i="1" smtClean="0">
+                                <a:latin typeface="Cambria Math" charset="0"/>
+                              </a:rPr>
+                              <m:t>𝑃𝑟𝑜𝑗𝑒𝑐𝑡</m:t>
+                            </m:r>
+                          </m:e>
+                          <m:sub>
+                            <m:r>
+                              <a:rPr lang="en-US" sz="1200" b="0" i="1" smtClean="0">
+                                <a:latin typeface="Cambria Math" charset="0"/>
+                              </a:rPr>
+                              <m:t>2</m:t>
+                            </m:r>
+                          </m:sub>
+                        </m:sSub>
+                      </m:oMath>
+                    </m:oMathPara>
+                  </a14:m>
+                  <a:endParaRPr lang="en-US" sz="1200" dirty="0"/>
+                </a:p>
+              </p:txBody>
+            </p:sp>
+          </mc:Choice>
+          <mc:Fallback>
+            <p:sp>
+              <p:nvSpPr>
+                <p:cNvPr id="54" name="Rectangle 53"/>
+                <p:cNvSpPr>
+                  <a:spLocks noRot="1" noChangeAspect="1" noMove="1" noResize="1" noEditPoints="1" noAdjustHandles="1" noChangeArrowheads="1" noChangeShapeType="1" noTextEdit="1"/>
+                </p:cNvSpPr>
+                <p:nvPr/>
+              </p:nvSpPr>
+              <p:spPr>
+                <a:xfrm>
+                  <a:off x="4930954" y="1607295"/>
+                  <a:ext cx="633974" cy="404446"/>
+                </a:xfrm>
+                <a:prstGeom prst="rect">
+                  <a:avLst/>
+                </a:prstGeom>
+                <a:blipFill rotWithShape="0">
+                  <a:blip r:embed="rId7"/>
+                  <a:stretch>
+                    <a:fillRect l="-9434"/>
+                  </a:stretch>
+                </a:blipFill>
+              </p:spPr>
+              <p:txBody>
+                <a:bodyPr/>
+                <a:lstStyle/>
+                <a:p>
+                  <a:r>
+                    <a:rPr lang="en-US">
+                      <a:noFill/>
+                    </a:rPr>
+                    <a:t> </a:t>
+                  </a:r>
+                </a:p>
+              </p:txBody>
+            </p:sp>
+          </mc:Fallback>
+        </mc:AlternateContent>
+        <p:sp>
+          <p:nvSpPr>
+            <p:cNvPr id="55" name="Rectangle 54"/>
+            <p:cNvSpPr/>
+            <p:nvPr/>
+          </p:nvSpPr>
+          <p:spPr>
+            <a:xfrm>
+              <a:off x="5821956" y="1607295"/>
+              <a:ext cx="353460" cy="404446"/>
+            </a:xfrm>
+            <a:prstGeom prst="rect">
+              <a:avLst/>
+            </a:prstGeom>
+          </p:spPr>
+          <p:style>
+            <a:lnRef idx="2">
+              <a:schemeClr val="dk1"/>
+            </a:lnRef>
+            <a:fillRef idx="1">
+              <a:schemeClr val="lt1"/>
+            </a:fillRef>
+            <a:effectRef idx="0">
+              <a:schemeClr val="dk1"/>
+            </a:effectRef>
+            <a:fontRef idx="minor">
+              <a:schemeClr val="dk1"/>
+            </a:fontRef>
+          </p:style>
+          <p:txBody>
+            <a:bodyPr lIns="0" rIns="0" rtlCol="0" anchor="ctr"/>
+            <a:lstStyle/>
+            <a:p>
+              <a:pPr algn="ctr"/>
+              <a:r>
+                <a:rPr lang="en-US" sz="1200" smtClean="0"/>
+                <a:t>...</a:t>
+              </a:r>
+              <a:endParaRPr lang="en-US" sz="1200" dirty="0"/>
+            </a:p>
+          </p:txBody>
+        </p:sp>
+        <mc:AlternateContent xmlns:mc="http://schemas.openxmlformats.org/markup-compatibility/2006">
+          <mc:Choice xmlns:a14="http://schemas.microsoft.com/office/drawing/2010/main" Requires="a14">
+            <p:sp>
+              <p:nvSpPr>
+                <p:cNvPr id="56" name="Rectangle 55"/>
+                <p:cNvSpPr/>
+                <p:nvPr/>
+              </p:nvSpPr>
+              <p:spPr>
+                <a:xfrm>
+                  <a:off x="6418104" y="1607295"/>
+                  <a:ext cx="633974" cy="404446"/>
+                </a:xfrm>
+                <a:prstGeom prst="rect">
+                  <a:avLst/>
+                </a:prstGeom>
+              </p:spPr>
+              <p:style>
+                <a:lnRef idx="2">
+                  <a:schemeClr val="dk1"/>
+                </a:lnRef>
+                <a:fillRef idx="1">
+                  <a:schemeClr val="lt1"/>
+                </a:fillRef>
+                <a:effectRef idx="0">
+                  <a:schemeClr val="dk1"/>
+                </a:effectRef>
+                <a:fontRef idx="minor">
+                  <a:schemeClr val="dk1"/>
+                </a:fontRef>
+              </p:style>
+              <p:txBody>
+                <a:bodyPr rtlCol="0" anchor="ctr"/>
+                <a:lstStyle/>
+                <a:p>
+                  <a:pPr algn="ctr"/>
+                  <a14:m>
+                    <m:oMathPara xmlns:m="http://schemas.openxmlformats.org/officeDocument/2006/math">
+                      <m:oMathParaPr>
+                        <m:jc m:val="center"/>
+                      </m:oMathParaPr>
+                      <m:oMath xmlns:m="http://schemas.openxmlformats.org/officeDocument/2006/math">
+                        <m:sSub>
+                          <m:sSubPr>
+                            <m:ctrlPr>
+                              <a:rPr lang="en-US" sz="1200" i="1" smtClean="0">
+                                <a:latin typeface="Cambria Math" charset="0"/>
+                              </a:rPr>
+                            </m:ctrlPr>
+                          </m:sSubPr>
+                          <m:e>
+                            <m:r>
+                              <a:rPr lang="en-US" sz="1200" b="0" i="1" smtClean="0">
+                                <a:latin typeface="Cambria Math" charset="0"/>
+                              </a:rPr>
+                              <m:t>𝑃𝑟𝑜𝑗𝑒𝑐𝑡</m:t>
+                            </m:r>
+                          </m:e>
+                          <m:sub>
+                            <m:r>
+                              <a:rPr lang="en-US" sz="1200" b="0" i="1" smtClean="0">
+                                <a:latin typeface="Cambria Math" charset="0"/>
+                              </a:rPr>
+                              <m:t>𝑛</m:t>
+                            </m:r>
+                          </m:sub>
+                        </m:sSub>
+                      </m:oMath>
+                    </m:oMathPara>
+                  </a14:m>
+                  <a:endParaRPr lang="en-US" sz="1200" dirty="0"/>
+                </a:p>
+              </p:txBody>
+            </p:sp>
+          </mc:Choice>
+          <mc:Fallback>
+            <p:sp>
+              <p:nvSpPr>
+                <p:cNvPr id="56" name="Rectangle 55"/>
+                <p:cNvSpPr>
+                  <a:spLocks noRot="1" noChangeAspect="1" noMove="1" noResize="1" noEditPoints="1" noAdjustHandles="1" noChangeArrowheads="1" noChangeShapeType="1" noTextEdit="1"/>
+                </p:cNvSpPr>
+                <p:nvPr/>
+              </p:nvSpPr>
+              <p:spPr>
+                <a:xfrm>
+                  <a:off x="6418104" y="1607295"/>
+                  <a:ext cx="633974" cy="404446"/>
+                </a:xfrm>
+                <a:prstGeom prst="rect">
+                  <a:avLst/>
+                </a:prstGeom>
+                <a:blipFill rotWithShape="0">
+                  <a:blip r:embed="rId8"/>
+                  <a:stretch>
+                    <a:fillRect l="-9434"/>
+                  </a:stretch>
+                </a:blipFill>
+              </p:spPr>
+              <p:txBody>
+                <a:bodyPr/>
+                <a:lstStyle/>
+                <a:p>
+                  <a:r>
+                    <a:rPr lang="en-US">
+                      <a:noFill/>
+                    </a:rPr>
+                    <a:t> </a:t>
+                  </a:r>
+                </a:p>
+              </p:txBody>
+            </p:sp>
+          </mc:Fallback>
+        </mc:AlternateContent>
+      </p:grpSp>
     </p:spTree>
     <p:extLst>
       <p:ext uri="{BB962C8B-B14F-4D97-AF65-F5344CB8AC3E}">

</xml_diff>